<commit_message>
Coding part:medicine type updated and some documentation part is done
</commit_message>
<xml_diff>
--- a/Design/Medino.pptx
+++ b/Design/Medino.pptx
@@ -6,11 +6,12 @@
   </p:sldMasterIdLst>
   <p:sldIdLst>
     <p:sldId id="256" r:id="rId2"/>
-    <p:sldId id="257" r:id="rId3"/>
-    <p:sldId id="258" r:id="rId4"/>
-    <p:sldId id="259" r:id="rId5"/>
-    <p:sldId id="260" r:id="rId6"/>
-    <p:sldId id="261" r:id="rId7"/>
+    <p:sldId id="262" r:id="rId3"/>
+    <p:sldId id="257" r:id="rId4"/>
+    <p:sldId id="258" r:id="rId5"/>
+    <p:sldId id="259" r:id="rId6"/>
+    <p:sldId id="260" r:id="rId7"/>
+    <p:sldId id="261" r:id="rId8"/>
   </p:sldIdLst>
   <p:sldSz cx="12192000" cy="6858000"/>
   <p:notesSz cx="6858000" cy="9144000"/>
@@ -391,7 +392,7 @@
           <a:p>
             <a:fld id="{78ABE3C1-DBE1-495D-B57B-2849774B866A}" type="datetimeFigureOut">
               <a:rPr lang="en-US" smtClean="0"/>
-              <a:t>3/7/2019</a:t>
+              <a:t>3/25/2019</a:t>
             </a:fld>
             <a:endParaRPr lang="en-US" dirty="0"/>
           </a:p>
@@ -805,7 +806,7 @@
           <a:p>
             <a:fld id="{446C117F-5CCF-4837-BE5F-2B92066CAFAF}" type="datetimeFigureOut">
               <a:rPr lang="en-US" smtClean="0"/>
-              <a:t>3/7/2019</a:t>
+              <a:t>3/25/2019</a:t>
             </a:fld>
             <a:endParaRPr lang="en-US" dirty="0"/>
           </a:p>
@@ -1141,7 +1142,7 @@
           <a:p>
             <a:fld id="{84EB90BD-B6CE-46B7-997F-7313B992CCDC}" type="datetimeFigureOut">
               <a:rPr lang="en-US" smtClean="0"/>
-              <a:t>3/7/2019</a:t>
+              <a:t>3/25/2019</a:t>
             </a:fld>
             <a:endParaRPr lang="en-US" dirty="0"/>
           </a:p>
@@ -1546,7 +1547,7 @@
           <a:p>
             <a:fld id="{CDB9D11F-B188-461D-B23F-39381795C052}" type="datetimeFigureOut">
               <a:rPr lang="en-US" smtClean="0"/>
-              <a:t>3/7/2019</a:t>
+              <a:t>3/25/2019</a:t>
             </a:fld>
             <a:endParaRPr lang="en-US" dirty="0"/>
           </a:p>
@@ -2114,7 +2115,7 @@
           <a:p>
             <a:fld id="{52E6D8D9-55A2-4063-B0F3-121F44549695}" type="datetimeFigureOut">
               <a:rPr lang="en-US" smtClean="0"/>
-              <a:t>3/7/2019</a:t>
+              <a:t>3/25/2019</a:t>
             </a:fld>
             <a:endParaRPr lang="en-US" dirty="0"/>
           </a:p>
@@ -2795,7 +2796,7 @@
           <a:p>
             <a:fld id="{D4B24536-994D-4021-A283-9F449C0DB509}" type="datetimeFigureOut">
               <a:rPr lang="en-US" smtClean="0"/>
-              <a:t>3/7/2019</a:t>
+              <a:t>3/25/2019</a:t>
             </a:fld>
             <a:endParaRPr lang="en-US" dirty="0"/>
           </a:p>
@@ -3708,7 +3709,7 @@
           <a:p>
             <a:fld id="{3CBBBB78-C96F-47B7-AB17-D852CA960AC9}" type="datetimeFigureOut">
               <a:rPr lang="en-US" smtClean="0"/>
-              <a:t>3/7/2019</a:t>
+              <a:t>3/25/2019</a:t>
             </a:fld>
             <a:endParaRPr lang="en-US" dirty="0"/>
           </a:p>
@@ -4021,7 +4022,7 @@
           <a:p>
             <a:fld id="{1FA3F48C-C7C6-4055-9F49-3777875E72AE}" type="datetimeFigureOut">
               <a:rPr lang="en-US" smtClean="0"/>
-              <a:t>3/7/2019</a:t>
+              <a:t>3/25/2019</a:t>
             </a:fld>
             <a:endParaRPr lang="en-US" dirty="0"/>
           </a:p>
@@ -4285,7 +4286,7 @@
           <a:p>
             <a:fld id="{6178E61D-D431-422C-9764-11DAFE33AB63}" type="datetimeFigureOut">
               <a:rPr lang="en-US" smtClean="0"/>
-              <a:t>3/7/2019</a:t>
+              <a:t>3/25/2019</a:t>
             </a:fld>
             <a:endParaRPr lang="en-US" dirty="0"/>
           </a:p>
@@ -4609,7 +4610,7 @@
           <a:p>
             <a:fld id="{12DE42F4-6EEF-4EF7-8ED4-2208F0F89A08}" type="datetimeFigureOut">
               <a:rPr lang="en-US" smtClean="0"/>
-              <a:t>3/7/2019</a:t>
+              <a:t>3/25/2019</a:t>
             </a:fld>
             <a:endParaRPr lang="en-US" dirty="0"/>
           </a:p>
@@ -4998,7 +4999,7 @@
           <a:p>
             <a:fld id="{30578ACC-22D6-47C1-A373-4FD133E34F3C}" type="datetimeFigureOut">
               <a:rPr lang="en-US" smtClean="0"/>
-              <a:t>3/7/2019</a:t>
+              <a:t>3/25/2019</a:t>
             </a:fld>
             <a:endParaRPr lang="en-US" dirty="0"/>
           </a:p>
@@ -5374,7 +5375,7 @@
           <a:p>
             <a:fld id="{4E5A6C69-6797-4E8A-BF37-F2C3751466E9}" type="datetimeFigureOut">
               <a:rPr lang="en-US" smtClean="0"/>
-              <a:t>3/7/2019</a:t>
+              <a:t>3/25/2019</a:t>
             </a:fld>
             <a:endParaRPr lang="en-US" dirty="0"/>
           </a:p>
@@ -5880,7 +5881,7 @@
           <a:p>
             <a:fld id="{D82014A1-A632-4878-A0D3-F52BA7563730}" type="datetimeFigureOut">
               <a:rPr lang="en-US" smtClean="0"/>
-              <a:t>3/7/2019</a:t>
+              <a:t>3/25/2019</a:t>
             </a:fld>
             <a:endParaRPr lang="en-US" dirty="0"/>
           </a:p>
@@ -6137,7 +6138,7 @@
           <a:p>
             <a:fld id="{CE99F462-093F-4566-844B-4C71F2739DA5}" type="datetimeFigureOut">
               <a:rPr lang="en-US" smtClean="0"/>
-              <a:t>3/7/2019</a:t>
+              <a:t>3/25/2019</a:t>
             </a:fld>
             <a:endParaRPr lang="en-US" dirty="0"/>
           </a:p>
@@ -6300,7 +6301,7 @@
           <a:p>
             <a:fld id="{3D24A7AC-904D-4781-85BA-7D10C17ED021}" type="datetimeFigureOut">
               <a:rPr lang="en-US" smtClean="0"/>
-              <a:t>3/7/2019</a:t>
+              <a:t>3/25/2019</a:t>
             </a:fld>
             <a:endParaRPr lang="en-US" dirty="0"/>
           </a:p>
@@ -6690,7 +6691,7 @@
           <a:p>
             <a:fld id="{E331444B-B92B-4E27-8C94-BB93EAF5CB18}" type="datetimeFigureOut">
               <a:rPr lang="en-US" smtClean="0"/>
-              <a:t>3/7/2019</a:t>
+              <a:t>3/25/2019</a:t>
             </a:fld>
             <a:endParaRPr lang="en-US" dirty="0"/>
           </a:p>
@@ -7099,7 +7100,7 @@
           <a:p>
             <a:fld id="{363EFA5E-FA76-400D-B3DC-F0BA90E6D107}" type="datetimeFigureOut">
               <a:rPr lang="en-US" smtClean="0"/>
-              <a:t>3/7/2019</a:t>
+              <a:t>3/25/2019</a:t>
             </a:fld>
             <a:endParaRPr lang="en-US" dirty="0"/>
           </a:p>
@@ -7343,7 +7344,7 @@
           <a:p>
             <a:fld id="{9D6E9DEC-419B-4CC5-A080-3B06BD5A8291}" type="datetimeFigureOut">
               <a:rPr lang="en-US" smtClean="0"/>
-              <a:t>3/7/2019</a:t>
+              <a:t>3/25/2019</a:t>
             </a:fld>
             <a:endParaRPr lang="en-US" dirty="0"/>
           </a:p>
@@ -7886,7 +7887,7 @@
           <p:cNvPr id="2" name="Title 1">
             <a:extLst>
               <a:ext uri="{FF2B5EF4-FFF2-40B4-BE49-F238E27FC236}">
-                <a16:creationId xmlns:a16="http://schemas.microsoft.com/office/drawing/2014/main" id="{8ADC20DC-E556-4C9D-93BF-E1AD7C63CF4F}"/>
+                <a16:creationId xmlns:a16="http://schemas.microsoft.com/office/drawing/2014/main" id="{89A20057-2E18-4C15-BF46-758406C59562}"/>
               </a:ext>
             </a:extLst>
           </p:cNvPr>
@@ -7904,7 +7905,7 @@
           <a:p>
             <a:r>
               <a:rPr lang="en-US" dirty="0"/>
-              <a:t>Introduction</a:t>
+              <a:t>Table of content</a:t>
             </a:r>
           </a:p>
         </p:txBody>
@@ -7914,7 +7915,7 @@
           <p:cNvPr id="3" name="Content Placeholder 2">
             <a:extLst>
               <a:ext uri="{FF2B5EF4-FFF2-40B4-BE49-F238E27FC236}">
-                <a16:creationId xmlns:a16="http://schemas.microsoft.com/office/drawing/2014/main" id="{F47DB064-87EA-4282-A97C-ABF3725E3F62}"/>
+                <a16:creationId xmlns:a16="http://schemas.microsoft.com/office/drawing/2014/main" id="{8C7AFD78-3351-4E7D-A059-0CCBFEB21268}"/>
               </a:ext>
             </a:extLst>
           </p:cNvPr>
@@ -7930,6 +7931,27 @@
           <a:bodyPr/>
           <a:lstStyle/>
           <a:p>
+            <a:r>
+              <a:rPr lang="en-US" dirty="0">
+                <a:latin typeface="Arial" panose="020B0604020202020204" pitchFamily="34" charset="0"/>
+                <a:cs typeface="Arial" panose="020B0604020202020204" pitchFamily="34" charset="0"/>
+              </a:rPr>
+              <a:t>Introduction</a:t>
+            </a:r>
+          </a:p>
+          <a:p>
+            <a:r>
+              <a:rPr lang="en-US" dirty="0"/>
+              <a:t>Analysis</a:t>
+            </a:r>
+          </a:p>
+          <a:p>
+            <a:r>
+              <a:rPr lang="en-US" dirty="0"/>
+              <a:t>Design</a:t>
+            </a:r>
+          </a:p>
+          <a:p>
             <a:endParaRPr lang="en-US" dirty="0"/>
           </a:p>
         </p:txBody>
@@ -7937,7 +7959,7 @@
     </p:spTree>
     <p:extLst>
       <p:ext uri="{BB962C8B-B14F-4D97-AF65-F5344CB8AC3E}">
-        <p14:creationId xmlns:p14="http://schemas.microsoft.com/office/powerpoint/2010/main" val="2936203275"/>
+        <p14:creationId xmlns:p14="http://schemas.microsoft.com/office/powerpoint/2010/main" val="1634077564"/>
       </p:ext>
     </p:extLst>
   </p:cSld>
@@ -7969,7 +7991,7 @@
           <p:cNvPr id="2" name="Title 1">
             <a:extLst>
               <a:ext uri="{FF2B5EF4-FFF2-40B4-BE49-F238E27FC236}">
-                <a16:creationId xmlns:a16="http://schemas.microsoft.com/office/drawing/2014/main" id="{F6EE8EED-FAB9-4E17-A811-F9116F994632}"/>
+                <a16:creationId xmlns:a16="http://schemas.microsoft.com/office/drawing/2014/main" id="{8ADC20DC-E556-4C9D-93BF-E1AD7C63CF4F}"/>
               </a:ext>
             </a:extLst>
           </p:cNvPr>
@@ -7987,7 +8009,7 @@
           <a:p>
             <a:r>
               <a:rPr lang="en-US" dirty="0"/>
-              <a:t>Why this project?</a:t>
+              <a:t>Introduction</a:t>
             </a:r>
           </a:p>
         </p:txBody>
@@ -7997,7 +8019,7 @@
           <p:cNvPr id="3" name="Content Placeholder 2">
             <a:extLst>
               <a:ext uri="{FF2B5EF4-FFF2-40B4-BE49-F238E27FC236}">
-                <a16:creationId xmlns:a16="http://schemas.microsoft.com/office/drawing/2014/main" id="{24304B30-C71F-415C-9351-4E9496D34EC5}"/>
+                <a16:creationId xmlns:a16="http://schemas.microsoft.com/office/drawing/2014/main" id="{F47DB064-87EA-4282-A97C-ABF3725E3F62}"/>
               </a:ext>
             </a:extLst>
           </p:cNvPr>
@@ -8020,7 +8042,7 @@
     </p:spTree>
     <p:extLst>
       <p:ext uri="{BB962C8B-B14F-4D97-AF65-F5344CB8AC3E}">
-        <p14:creationId xmlns:p14="http://schemas.microsoft.com/office/powerpoint/2010/main" val="1721117510"/>
+        <p14:creationId xmlns:p14="http://schemas.microsoft.com/office/powerpoint/2010/main" val="2936203275"/>
       </p:ext>
     </p:extLst>
   </p:cSld>
@@ -8052,7 +8074,7 @@
           <p:cNvPr id="2" name="Title 1">
             <a:extLst>
               <a:ext uri="{FF2B5EF4-FFF2-40B4-BE49-F238E27FC236}">
-                <a16:creationId xmlns:a16="http://schemas.microsoft.com/office/drawing/2014/main" id="{803FF973-6C4D-438A-825C-6A5DAE70560A}"/>
+                <a16:creationId xmlns:a16="http://schemas.microsoft.com/office/drawing/2014/main" id="{F6EE8EED-FAB9-4E17-A811-F9116F994632}"/>
               </a:ext>
             </a:extLst>
           </p:cNvPr>
@@ -8070,7 +8092,7 @@
           <a:p>
             <a:r>
               <a:rPr lang="en-US" dirty="0"/>
-              <a:t>Aims and Objectives</a:t>
+              <a:t>Why this project?</a:t>
             </a:r>
           </a:p>
         </p:txBody>
@@ -8080,7 +8102,7 @@
           <p:cNvPr id="3" name="Content Placeholder 2">
             <a:extLst>
               <a:ext uri="{FF2B5EF4-FFF2-40B4-BE49-F238E27FC236}">
-                <a16:creationId xmlns:a16="http://schemas.microsoft.com/office/drawing/2014/main" id="{97924ECE-D17B-4ADD-90F6-9A471CB12624}"/>
+                <a16:creationId xmlns:a16="http://schemas.microsoft.com/office/drawing/2014/main" id="{24304B30-C71F-415C-9351-4E9496D34EC5}"/>
               </a:ext>
             </a:extLst>
           </p:cNvPr>
@@ -8096,24 +8118,6 @@
           <a:bodyPr/>
           <a:lstStyle/>
           <a:p>
-            <a:r>
-              <a:rPr lang="en-US" dirty="0"/>
-              <a:t>To maintain the consumable drugs for the patient, manage the medicine stock and generate an automated bill.</a:t>
-            </a:r>
-          </a:p>
-          <a:p>
-            <a:r>
-              <a:rPr lang="en-US" dirty="0"/>
-              <a:t>Provides the user-friendly interface</a:t>
-            </a:r>
-          </a:p>
-          <a:p>
-            <a:r>
-              <a:rPr lang="en-US" dirty="0"/>
-              <a:t>Online medicine order</a:t>
-            </a:r>
-          </a:p>
-          <a:p>
             <a:endParaRPr lang="en-US" dirty="0"/>
           </a:p>
         </p:txBody>
@@ -8121,7 +8125,7 @@
     </p:spTree>
     <p:extLst>
       <p:ext uri="{BB962C8B-B14F-4D97-AF65-F5344CB8AC3E}">
-        <p14:creationId xmlns:p14="http://schemas.microsoft.com/office/powerpoint/2010/main" val="322275511"/>
+        <p14:creationId xmlns:p14="http://schemas.microsoft.com/office/powerpoint/2010/main" val="1721117510"/>
       </p:ext>
     </p:extLst>
   </p:cSld>
@@ -8153,6 +8157,107 @@
           <p:cNvPr id="2" name="Title 1">
             <a:extLst>
               <a:ext uri="{FF2B5EF4-FFF2-40B4-BE49-F238E27FC236}">
+                <a16:creationId xmlns:a16="http://schemas.microsoft.com/office/drawing/2014/main" id="{803FF973-6C4D-438A-825C-6A5DAE70560A}"/>
+              </a:ext>
+            </a:extLst>
+          </p:cNvPr>
+          <p:cNvSpPr>
+            <a:spLocks noGrp="1"/>
+          </p:cNvSpPr>
+          <p:nvPr>
+            <p:ph type="title"/>
+          </p:nvPr>
+        </p:nvSpPr>
+        <p:spPr/>
+        <p:txBody>
+          <a:bodyPr/>
+          <a:lstStyle/>
+          <a:p>
+            <a:r>
+              <a:rPr lang="en-US" dirty="0"/>
+              <a:t>Aims and Objectives</a:t>
+            </a:r>
+          </a:p>
+        </p:txBody>
+      </p:sp>
+      <p:sp>
+        <p:nvSpPr>
+          <p:cNvPr id="3" name="Content Placeholder 2">
+            <a:extLst>
+              <a:ext uri="{FF2B5EF4-FFF2-40B4-BE49-F238E27FC236}">
+                <a16:creationId xmlns:a16="http://schemas.microsoft.com/office/drawing/2014/main" id="{97924ECE-D17B-4ADD-90F6-9A471CB12624}"/>
+              </a:ext>
+            </a:extLst>
+          </p:cNvPr>
+          <p:cNvSpPr>
+            <a:spLocks noGrp="1"/>
+          </p:cNvSpPr>
+          <p:nvPr>
+            <p:ph idx="1"/>
+          </p:nvPr>
+        </p:nvSpPr>
+        <p:spPr/>
+        <p:txBody>
+          <a:bodyPr/>
+          <a:lstStyle/>
+          <a:p>
+            <a:r>
+              <a:rPr lang="en-US" dirty="0"/>
+              <a:t>To maintain the consumable drugs for the patient, manage the medicine stock and generate an automated bill.</a:t>
+            </a:r>
+          </a:p>
+          <a:p>
+            <a:r>
+              <a:rPr lang="en-US" dirty="0"/>
+              <a:t>Provides the user-friendly interface</a:t>
+            </a:r>
+          </a:p>
+          <a:p>
+            <a:r>
+              <a:rPr lang="en-US" dirty="0"/>
+              <a:t>Online medicine order</a:t>
+            </a:r>
+          </a:p>
+          <a:p>
+            <a:endParaRPr lang="en-US" dirty="0"/>
+          </a:p>
+        </p:txBody>
+      </p:sp>
+    </p:spTree>
+    <p:extLst>
+      <p:ext uri="{BB962C8B-B14F-4D97-AF65-F5344CB8AC3E}">
+        <p14:creationId xmlns:p14="http://schemas.microsoft.com/office/powerpoint/2010/main" val="322275511"/>
+      </p:ext>
+    </p:extLst>
+  </p:cSld>
+  <p:clrMapOvr>
+    <a:masterClrMapping/>
+  </p:clrMapOvr>
+</p:sld>
+</file>
+
+<file path=ppt/slides/slide6.xml><?xml version="1.0" encoding="utf-8"?>
+<p:sld xmlns:a="http://schemas.openxmlformats.org/drawingml/2006/main" xmlns:r="http://schemas.openxmlformats.org/officeDocument/2006/relationships" xmlns:p="http://schemas.openxmlformats.org/presentationml/2006/main">
+  <p:cSld>
+    <p:spTree>
+      <p:nvGrpSpPr>
+        <p:cNvPr id="1" name=""/>
+        <p:cNvGrpSpPr/>
+        <p:nvPr/>
+      </p:nvGrpSpPr>
+      <p:grpSpPr>
+        <a:xfrm>
+          <a:off x="0" y="0"/>
+          <a:ext cx="0" cy="0"/>
+          <a:chOff x="0" y="0"/>
+          <a:chExt cx="0" cy="0"/>
+        </a:xfrm>
+      </p:grpSpPr>
+      <p:sp>
+        <p:nvSpPr>
+          <p:cNvPr id="2" name="Title 1">
+            <a:extLst>
+              <a:ext uri="{FF2B5EF4-FFF2-40B4-BE49-F238E27FC236}">
                 <a16:creationId xmlns:a16="http://schemas.microsoft.com/office/drawing/2014/main" id="{0F3650C8-C861-4D60-A6CB-AE341B17E466}"/>
               </a:ext>
             </a:extLst>
@@ -8229,7 +8334,7 @@
 </p:sld>
 </file>
 
-<file path=ppt/slides/slide6.xml><?xml version="1.0" encoding="utf-8"?>
+<file path=ppt/slides/slide7.xml><?xml version="1.0" encoding="utf-8"?>
 <p:sld xmlns:a="http://schemas.openxmlformats.org/drawingml/2006/main" xmlns:r="http://schemas.openxmlformats.org/officeDocument/2006/relationships" xmlns:p="http://schemas.openxmlformats.org/presentationml/2006/main">
   <p:cSld>
     <p:spTree>

</xml_diff>